<commit_message>
ADF Status Function Tweaks
</commit_message>
<xml_diff>
--- a/Get Any Azure Data Factory Pipeline Run Status with Azure Functions/Visual.pptx
+++ b/Get Any Azure Data Factory Pipeline Run Status with Azure Functions/Visual.pptx
@@ -104,6 +104,11 @@
       </a:defRPr>
     </a:lvl9pPr>
   </p:defaultTextStyle>
+  <p:extLst>
+    <p:ext uri="{EFAFB233-063F-42B5-8137-9DF3F51BA10A}">
+      <p15:sldGuideLst xmlns:p15="http://schemas.microsoft.com/office/powerpoint/2012/main"/>
+    </p:ext>
+  </p:extLst>
 </p:presentation>
 </file>
 
@@ -256,7 +261,7 @@
           <a:p>
             <a:fld id="{2E9C8D12-1B73-43A3-B81C-573FB1DBBB8F}" type="datetimeFigureOut">
               <a:rPr lang="en-GB" smtClean="0"/>
-              <a:t>20/11/2019</a:t>
+              <a:t>21/11/2019</a:t>
             </a:fld>
             <a:endParaRPr lang="en-GB"/>
           </a:p>
@@ -456,7 +461,7 @@
           <a:p>
             <a:fld id="{2E9C8D12-1B73-43A3-B81C-573FB1DBBB8F}" type="datetimeFigureOut">
               <a:rPr lang="en-GB" smtClean="0"/>
-              <a:t>20/11/2019</a:t>
+              <a:t>21/11/2019</a:t>
             </a:fld>
             <a:endParaRPr lang="en-GB"/>
           </a:p>
@@ -666,7 +671,7 @@
           <a:p>
             <a:fld id="{2E9C8D12-1B73-43A3-B81C-573FB1DBBB8F}" type="datetimeFigureOut">
               <a:rPr lang="en-GB" smtClean="0"/>
-              <a:t>20/11/2019</a:t>
+              <a:t>21/11/2019</a:t>
             </a:fld>
             <a:endParaRPr lang="en-GB"/>
           </a:p>
@@ -866,7 +871,7 @@
           <a:p>
             <a:fld id="{2E9C8D12-1B73-43A3-B81C-573FB1DBBB8F}" type="datetimeFigureOut">
               <a:rPr lang="en-GB" smtClean="0"/>
-              <a:t>20/11/2019</a:t>
+              <a:t>21/11/2019</a:t>
             </a:fld>
             <a:endParaRPr lang="en-GB"/>
           </a:p>
@@ -1142,7 +1147,7 @@
           <a:p>
             <a:fld id="{2E9C8D12-1B73-43A3-B81C-573FB1DBBB8F}" type="datetimeFigureOut">
               <a:rPr lang="en-GB" smtClean="0"/>
-              <a:t>20/11/2019</a:t>
+              <a:t>21/11/2019</a:t>
             </a:fld>
             <a:endParaRPr lang="en-GB"/>
           </a:p>
@@ -1410,7 +1415,7 @@
           <a:p>
             <a:fld id="{2E9C8D12-1B73-43A3-B81C-573FB1DBBB8F}" type="datetimeFigureOut">
               <a:rPr lang="en-GB" smtClean="0"/>
-              <a:t>20/11/2019</a:t>
+              <a:t>21/11/2019</a:t>
             </a:fld>
             <a:endParaRPr lang="en-GB"/>
           </a:p>
@@ -1825,7 +1830,7 @@
           <a:p>
             <a:fld id="{2E9C8D12-1B73-43A3-B81C-573FB1DBBB8F}" type="datetimeFigureOut">
               <a:rPr lang="en-GB" smtClean="0"/>
-              <a:t>20/11/2019</a:t>
+              <a:t>21/11/2019</a:t>
             </a:fld>
             <a:endParaRPr lang="en-GB"/>
           </a:p>
@@ -1967,7 +1972,7 @@
           <a:p>
             <a:fld id="{2E9C8D12-1B73-43A3-B81C-573FB1DBBB8F}" type="datetimeFigureOut">
               <a:rPr lang="en-GB" smtClean="0"/>
-              <a:t>20/11/2019</a:t>
+              <a:t>21/11/2019</a:t>
             </a:fld>
             <a:endParaRPr lang="en-GB"/>
           </a:p>
@@ -2080,7 +2085,7 @@
           <a:p>
             <a:fld id="{2E9C8D12-1B73-43A3-B81C-573FB1DBBB8F}" type="datetimeFigureOut">
               <a:rPr lang="en-GB" smtClean="0"/>
-              <a:t>20/11/2019</a:t>
+              <a:t>21/11/2019</a:t>
             </a:fld>
             <a:endParaRPr lang="en-GB"/>
           </a:p>
@@ -2393,7 +2398,7 @@
           <a:p>
             <a:fld id="{2E9C8D12-1B73-43A3-B81C-573FB1DBBB8F}" type="datetimeFigureOut">
               <a:rPr lang="en-GB" smtClean="0"/>
-              <a:t>20/11/2019</a:t>
+              <a:t>21/11/2019</a:t>
             </a:fld>
             <a:endParaRPr lang="en-GB"/>
           </a:p>
@@ -2682,7 +2687,7 @@
           <a:p>
             <a:fld id="{2E9C8D12-1B73-43A3-B81C-573FB1DBBB8F}" type="datetimeFigureOut">
               <a:rPr lang="en-GB" smtClean="0"/>
-              <a:t>20/11/2019</a:t>
+              <a:t>21/11/2019</a:t>
             </a:fld>
             <a:endParaRPr lang="en-GB"/>
           </a:p>
@@ -2925,7 +2930,7 @@
           <a:p>
             <a:fld id="{2E9C8D12-1B73-43A3-B81C-573FB1DBBB8F}" type="datetimeFigureOut">
               <a:rPr lang="en-GB" smtClean="0"/>
-              <a:t>20/11/2019</a:t>
+              <a:t>21/11/2019</a:t>
             </a:fld>
             <a:endParaRPr lang="en-GB"/>
           </a:p>
@@ -4042,6 +4047,36 @@
           </a:fontRef>
         </p:style>
       </p:cxnSp>
+      <p:pic>
+        <p:nvPicPr>
+          <p:cNvPr id="22" name="Picture 21">
+            <a:extLst>
+              <a:ext uri="{FF2B5EF4-FFF2-40B4-BE49-F238E27FC236}">
+                <a16:creationId xmlns:a16="http://schemas.microsoft.com/office/drawing/2014/main" id="{218A864D-9684-4CBD-B7A1-8E6ED2524346}"/>
+              </a:ext>
+            </a:extLst>
+          </p:cNvPr>
+          <p:cNvPicPr>
+            <a:picLocks noChangeAspect="1"/>
+          </p:cNvPicPr>
+          <p:nvPr/>
+        </p:nvPicPr>
+        <p:blipFill>
+          <a:blip r:embed="rId4"/>
+          <a:stretch>
+            <a:fillRect/>
+          </a:stretch>
+        </p:blipFill>
+        <p:spPr>
+          <a:xfrm>
+            <a:off x="8160393" y="4778071"/>
+            <a:ext cx="316214" cy="315846"/>
+          </a:xfrm>
+          <a:prstGeom prst="rect">
+            <a:avLst/>
+          </a:prstGeom>
+        </p:spPr>
+      </p:pic>
     </p:spTree>
     <p:extLst>
       <p:ext uri="{BB962C8B-B14F-4D97-AF65-F5344CB8AC3E}">

</xml_diff>